<commit_message>
Additional Progress on presentation.
</commit_message>
<xml_diff>
--- a/Presentation/CSCM10 - Presentation.pptx
+++ b/Presentation/CSCM10 - Presentation.pptx
@@ -23327,7 +23327,7 @@
           <a:p>
             <a:fld id="{7457A4B1-A375-7047-B4B5-7949D5D46997}" type="datetimeFigureOut">
               <a:rPr lang="en-GB" smtClean="0"/>
-              <a:t>06/03/2020</a:t>
+              <a:t>13/03/2020</a:t>
             </a:fld>
             <a:endParaRPr lang="en-GB"/>
           </a:p>
@@ -23525,7 +23525,7 @@
           <a:p>
             <a:fld id="{7457A4B1-A375-7047-B4B5-7949D5D46997}" type="datetimeFigureOut">
               <a:rPr lang="en-GB" smtClean="0"/>
-              <a:t>06/03/2020</a:t>
+              <a:t>13/03/2020</a:t>
             </a:fld>
             <a:endParaRPr lang="en-GB"/>
           </a:p>
@@ -23733,7 +23733,7 @@
           <a:p>
             <a:fld id="{7457A4B1-A375-7047-B4B5-7949D5D46997}" type="datetimeFigureOut">
               <a:rPr lang="en-GB" smtClean="0"/>
-              <a:t>06/03/2020</a:t>
+              <a:t>13/03/2020</a:t>
             </a:fld>
             <a:endParaRPr lang="en-GB"/>
           </a:p>
@@ -23931,7 +23931,7 @@
           <a:p>
             <a:fld id="{7457A4B1-A375-7047-B4B5-7949D5D46997}" type="datetimeFigureOut">
               <a:rPr lang="en-GB" smtClean="0"/>
-              <a:t>06/03/2020</a:t>
+              <a:t>13/03/2020</a:t>
             </a:fld>
             <a:endParaRPr lang="en-GB"/>
           </a:p>
@@ -24206,7 +24206,7 @@
           <a:p>
             <a:fld id="{7457A4B1-A375-7047-B4B5-7949D5D46997}" type="datetimeFigureOut">
               <a:rPr lang="en-GB" smtClean="0"/>
-              <a:t>06/03/2020</a:t>
+              <a:t>13/03/2020</a:t>
             </a:fld>
             <a:endParaRPr lang="en-GB"/>
           </a:p>
@@ -24471,7 +24471,7 @@
           <a:p>
             <a:fld id="{7457A4B1-A375-7047-B4B5-7949D5D46997}" type="datetimeFigureOut">
               <a:rPr lang="en-GB" smtClean="0"/>
-              <a:t>06/03/2020</a:t>
+              <a:t>13/03/2020</a:t>
             </a:fld>
             <a:endParaRPr lang="en-GB"/>
           </a:p>
@@ -24883,7 +24883,7 @@
           <a:p>
             <a:fld id="{7457A4B1-A375-7047-B4B5-7949D5D46997}" type="datetimeFigureOut">
               <a:rPr lang="en-GB" smtClean="0"/>
-              <a:t>06/03/2020</a:t>
+              <a:t>13/03/2020</a:t>
             </a:fld>
             <a:endParaRPr lang="en-GB"/>
           </a:p>
@@ -25024,7 +25024,7 @@
           <a:p>
             <a:fld id="{7457A4B1-A375-7047-B4B5-7949D5D46997}" type="datetimeFigureOut">
               <a:rPr lang="en-GB" smtClean="0"/>
-              <a:t>06/03/2020</a:t>
+              <a:t>13/03/2020</a:t>
             </a:fld>
             <a:endParaRPr lang="en-GB"/>
           </a:p>
@@ -25137,7 +25137,7 @@
           <a:p>
             <a:fld id="{7457A4B1-A375-7047-B4B5-7949D5D46997}" type="datetimeFigureOut">
               <a:rPr lang="en-GB" smtClean="0"/>
-              <a:t>06/03/2020</a:t>
+              <a:t>13/03/2020</a:t>
             </a:fld>
             <a:endParaRPr lang="en-GB"/>
           </a:p>
@@ -25448,7 +25448,7 @@
           <a:p>
             <a:fld id="{7457A4B1-A375-7047-B4B5-7949D5D46997}" type="datetimeFigureOut">
               <a:rPr lang="en-GB" smtClean="0"/>
-              <a:t>06/03/2020</a:t>
+              <a:t>13/03/2020</a:t>
             </a:fld>
             <a:endParaRPr lang="en-GB"/>
           </a:p>
@@ -25736,7 +25736,7 @@
           <a:p>
             <a:fld id="{7457A4B1-A375-7047-B4B5-7949D5D46997}" type="datetimeFigureOut">
               <a:rPr lang="en-GB" smtClean="0"/>
-              <a:t>06/03/2020</a:t>
+              <a:t>13/03/2020</a:t>
             </a:fld>
             <a:endParaRPr lang="en-GB"/>
           </a:p>
@@ -25977,7 +25977,7 @@
           <a:p>
             <a:fld id="{7457A4B1-A375-7047-B4B5-7949D5D46997}" type="datetimeFigureOut">
               <a:rPr lang="en-GB" smtClean="0"/>
-              <a:t>06/03/2020</a:t>
+              <a:t>13/03/2020</a:t>
             </a:fld>
             <a:endParaRPr lang="en-GB"/>
           </a:p>
@@ -28913,11 +28913,35 @@
           </a:bodyPr>
           <a:lstStyle/>
           <a:p>
-            <a:endParaRPr lang="en-GB" sz="2400" dirty="0">
-              <a:solidFill>
-                <a:schemeClr val="bg1"/>
-              </a:solidFill>
-            </a:endParaRPr>
+            <a:r>
+              <a:rPr lang="en-GB" sz="2400" dirty="0">
+                <a:solidFill>
+                  <a:schemeClr val="bg1"/>
+                </a:solidFill>
+              </a:rPr>
+              <a:t>Talk about games : - Gamification</a:t>
+            </a:r>
+          </a:p>
+          <a:p>
+            <a:r>
+              <a:rPr lang="en-GB" sz="2400" dirty="0">
+                <a:solidFill>
+                  <a:schemeClr val="bg1"/>
+                </a:solidFill>
+              </a:rPr>
+              <a:t>Tal about ML:</a:t>
+            </a:r>
+          </a:p>
+          <a:p>
+            <a:pPr lvl="1"/>
+            <a:r>
+              <a:rPr lang="en-GB" sz="2000" dirty="0">
+                <a:solidFill>
+                  <a:schemeClr val="bg1"/>
+                </a:solidFill>
+              </a:rPr>
+              <a:t>Subtopic of Artificial intelligence. </a:t>
+            </a:r>
           </a:p>
         </p:txBody>
       </p:sp>

</xml_diff>